<commit_message>
Final Version - Added Dimension Reduction to code and presentation
</commit_message>
<xml_diff>
--- a/פרוייקט-למידת מכונה.pptx
+++ b/פרוייקט-למידת מכונה.pptx
@@ -17,7 +17,8 @@
     <p:sldId id="265" r:id="rId11"/>
     <p:sldId id="272" r:id="rId12"/>
     <p:sldId id="271" r:id="rId13"/>
-    <p:sldId id="270" r:id="rId14"/>
+    <p:sldId id="273" r:id="rId14"/>
+    <p:sldId id="270" r:id="rId15"/>
   </p:sldIdLst>
   <p:sldSz cx="12192000" cy="6858000"/>
   <p:notesSz cx="6858000" cy="9144000"/>
@@ -310,7 +311,7 @@
           <a:p>
             <a:fld id="{FCB19C4E-51C6-4651-A61A-425B7C95F6FD}" type="datetimeFigureOut">
               <a:rPr lang="en-US" smtClean="0"/>
-              <a:t>2/8/2022</a:t>
+              <a:t>2/13/2022</a:t>
             </a:fld>
             <a:endParaRPr lang="en-US"/>
           </a:p>
@@ -585,7 +586,7 @@
           <a:p>
             <a:fld id="{FCB19C4E-51C6-4651-A61A-425B7C95F6FD}" type="datetimeFigureOut">
               <a:rPr lang="en-US" smtClean="0"/>
-              <a:t>2/8/2022</a:t>
+              <a:t>2/13/2022</a:t>
             </a:fld>
             <a:endParaRPr lang="en-US"/>
           </a:p>
@@ -779,7 +780,7 @@
           <a:p>
             <a:fld id="{FCB19C4E-51C6-4651-A61A-425B7C95F6FD}" type="datetimeFigureOut">
               <a:rPr lang="en-US" smtClean="0"/>
-              <a:t>2/8/2022</a:t>
+              <a:t>2/13/2022</a:t>
             </a:fld>
             <a:endParaRPr lang="en-US"/>
           </a:p>
@@ -1050,7 +1051,7 @@
           <a:p>
             <a:fld id="{FCB19C4E-51C6-4651-A61A-425B7C95F6FD}" type="datetimeFigureOut">
               <a:rPr lang="en-US" smtClean="0"/>
-              <a:t>2/8/2022</a:t>
+              <a:t>2/13/2022</a:t>
             </a:fld>
             <a:endParaRPr lang="en-US"/>
           </a:p>
@@ -1377,7 +1378,7 @@
           <a:p>
             <a:fld id="{FCB19C4E-51C6-4651-A61A-425B7C95F6FD}" type="datetimeFigureOut">
               <a:rPr lang="en-US" smtClean="0"/>
-              <a:t>2/8/2022</a:t>
+              <a:t>2/13/2022</a:t>
             </a:fld>
             <a:endParaRPr lang="en-US"/>
           </a:p>
@@ -1996,7 +1997,7 @@
           <a:p>
             <a:fld id="{FCB19C4E-51C6-4651-A61A-425B7C95F6FD}" type="datetimeFigureOut">
               <a:rPr lang="en-US" smtClean="0"/>
-              <a:t>2/8/2022</a:t>
+              <a:t>2/13/2022</a:t>
             </a:fld>
             <a:endParaRPr lang="en-US"/>
           </a:p>
@@ -2843,7 +2844,7 @@
           <a:p>
             <a:fld id="{FCB19C4E-51C6-4651-A61A-425B7C95F6FD}" type="datetimeFigureOut">
               <a:rPr lang="en-US" smtClean="0"/>
-              <a:t>2/8/2022</a:t>
+              <a:t>2/13/2022</a:t>
             </a:fld>
             <a:endParaRPr lang="en-US"/>
           </a:p>
@@ -3013,7 +3014,7 @@
           <a:p>
             <a:fld id="{FCB19C4E-51C6-4651-A61A-425B7C95F6FD}" type="datetimeFigureOut">
               <a:rPr lang="en-US" smtClean="0"/>
-              <a:t>2/8/2022</a:t>
+              <a:t>2/13/2022</a:t>
             </a:fld>
             <a:endParaRPr lang="en-US"/>
           </a:p>
@@ -3193,7 +3194,7 @@
           <a:p>
             <a:fld id="{FCB19C4E-51C6-4651-A61A-425B7C95F6FD}" type="datetimeFigureOut">
               <a:rPr lang="en-US" smtClean="0"/>
-              <a:t>2/8/2022</a:t>
+              <a:t>2/13/2022</a:t>
             </a:fld>
             <a:endParaRPr lang="en-US"/>
           </a:p>
@@ -3363,7 +3364,7 @@
           <a:p>
             <a:fld id="{FCB19C4E-51C6-4651-A61A-425B7C95F6FD}" type="datetimeFigureOut">
               <a:rPr lang="en-US" smtClean="0"/>
-              <a:t>2/8/2022</a:t>
+              <a:t>2/13/2022</a:t>
             </a:fld>
             <a:endParaRPr lang="en-US"/>
           </a:p>
@@ -3610,7 +3611,7 @@
           <a:p>
             <a:fld id="{FCB19C4E-51C6-4651-A61A-425B7C95F6FD}" type="datetimeFigureOut">
               <a:rPr lang="en-US" smtClean="0"/>
-              <a:t>2/8/2022</a:t>
+              <a:t>2/13/2022</a:t>
             </a:fld>
             <a:endParaRPr lang="en-US"/>
           </a:p>
@@ -3902,7 +3903,7 @@
           <a:p>
             <a:fld id="{FCB19C4E-51C6-4651-A61A-425B7C95F6FD}" type="datetimeFigureOut">
               <a:rPr lang="en-US" smtClean="0"/>
-              <a:t>2/8/2022</a:t>
+              <a:t>2/13/2022</a:t>
             </a:fld>
             <a:endParaRPr lang="en-US"/>
           </a:p>
@@ -4346,7 +4347,7 @@
           <a:p>
             <a:fld id="{FCB19C4E-51C6-4651-A61A-425B7C95F6FD}" type="datetimeFigureOut">
               <a:rPr lang="en-US" smtClean="0"/>
-              <a:t>2/8/2022</a:t>
+              <a:t>2/13/2022</a:t>
             </a:fld>
             <a:endParaRPr lang="en-US"/>
           </a:p>
@@ -4464,7 +4465,7 @@
           <a:p>
             <a:fld id="{FCB19C4E-51C6-4651-A61A-425B7C95F6FD}" type="datetimeFigureOut">
               <a:rPr lang="en-US" smtClean="0"/>
-              <a:t>2/8/2022</a:t>
+              <a:t>2/13/2022</a:t>
             </a:fld>
             <a:endParaRPr lang="en-US"/>
           </a:p>
@@ -4559,7 +4560,7 @@
           <a:p>
             <a:fld id="{FCB19C4E-51C6-4651-A61A-425B7C95F6FD}" type="datetimeFigureOut">
               <a:rPr lang="en-US" smtClean="0"/>
-              <a:t>2/8/2022</a:t>
+              <a:t>2/13/2022</a:t>
             </a:fld>
             <a:endParaRPr lang="en-US"/>
           </a:p>
@@ -4838,7 +4839,7 @@
           <a:p>
             <a:fld id="{FCB19C4E-51C6-4651-A61A-425B7C95F6FD}" type="datetimeFigureOut">
               <a:rPr lang="en-US" smtClean="0"/>
-              <a:t>2/8/2022</a:t>
+              <a:t>2/13/2022</a:t>
             </a:fld>
             <a:endParaRPr lang="en-US"/>
           </a:p>
@@ -5113,7 +5114,7 @@
           <a:p>
             <a:fld id="{FCB19C4E-51C6-4651-A61A-425B7C95F6FD}" type="datetimeFigureOut">
               <a:rPr lang="en-US" smtClean="0"/>
-              <a:t>2/8/2022</a:t>
+              <a:t>2/13/2022</a:t>
             </a:fld>
             <a:endParaRPr lang="en-US"/>
           </a:p>
@@ -5536,7 +5537,7 @@
           <a:p>
             <a:fld id="{FCB19C4E-51C6-4651-A61A-425B7C95F6FD}" type="datetimeFigureOut">
               <a:rPr lang="en-US" smtClean="0"/>
-              <a:t>2/8/2022</a:t>
+              <a:t>2/13/2022</a:t>
             </a:fld>
             <a:endParaRPr lang="en-US"/>
           </a:p>
@@ -7778,6 +7779,898 @@
           <a:chExt cx="0" cy="0"/>
         </a:xfrm>
       </p:grpSpPr>
+      <p:sp>
+        <p:nvSpPr>
+          <p:cNvPr id="2" name="Title 1">
+            <a:extLst>
+              <a:ext uri="{FF2B5EF4-FFF2-40B4-BE49-F238E27FC236}">
+                <a16:creationId xmlns:a16="http://schemas.microsoft.com/office/drawing/2014/main" id="{A0F761FA-30A1-4DF6-AD6C-0CC610420D61}"/>
+              </a:ext>
+            </a:extLst>
+          </p:cNvPr>
+          <p:cNvSpPr>
+            <a:spLocks noGrp="1"/>
+          </p:cNvSpPr>
+          <p:nvPr>
+            <p:ph type="title"/>
+          </p:nvPr>
+        </p:nvSpPr>
+        <p:spPr>
+          <a:xfrm>
+            <a:off x="643855" y="1447799"/>
+            <a:ext cx="3108626" cy="1444752"/>
+          </a:xfrm>
+        </p:spPr>
+        <p:txBody>
+          <a:bodyPr vert="horz" lIns="91440" tIns="45720" rIns="91440" bIns="45720" rtlCol="0" anchor="b">
+            <a:noAutofit/>
+          </a:bodyPr>
+          <a:lstStyle/>
+          <a:p>
+            <a:r>
+              <a:rPr lang="en-US" sz="4800" dirty="0">
+                <a:latin typeface="Arial" panose="020B0604020202020204" pitchFamily="34" charset="0"/>
+                <a:cs typeface="Arial" panose="020B0604020202020204" pitchFamily="34" charset="0"/>
+              </a:rPr>
+              <a:t>Dimension Reduction</a:t>
+            </a:r>
+          </a:p>
+        </p:txBody>
+      </p:sp>
+      <p:sp>
+        <p:nvSpPr>
+          <p:cNvPr id="49" name="Freeform 11">
+            <a:extLst>
+              <a:ext uri="{FF2B5EF4-FFF2-40B4-BE49-F238E27FC236}">
+                <a16:creationId xmlns:a16="http://schemas.microsoft.com/office/drawing/2014/main" id="{658368D8-D75D-4823-A7A0-A59C08C6FE28}"/>
+              </a:ext>
+              <a:ext uri="{C183D7F6-B498-43B3-948B-1728B52AA6E4}">
+                <adec:decorative xmlns:adec="http://schemas.microsoft.com/office/drawing/2017/decorative" val="1"/>
+              </a:ext>
+            </a:extLst>
+          </p:cNvPr>
+          <p:cNvSpPr>
+            <a:spLocks noGrp="1" noRot="1" noChangeAspect="1" noMove="1" noResize="1" noEditPoints="1" noAdjustHandles="1" noChangeArrowheads="1" noChangeShapeType="1" noTextEdit="1"/>
+          </p:cNvSpPr>
+          <p:nvPr>
+            <p:extLst>
+              <p:ext uri="{386F3935-93C4-4BCD-93E2-E3B085C9AB24}">
+                <p16:designElem xmlns:p16="http://schemas.microsoft.com/office/powerpoint/2015/main" val="1"/>
+              </p:ext>
+            </p:extLst>
+          </p:nvPr>
+        </p:nvSpPr>
+        <p:spPr>
+          <a:xfrm>
+            <a:off x="3948110" y="-1"/>
+            <a:ext cx="559472" cy="3709642"/>
+          </a:xfrm>
+          <a:custGeom>
+            <a:avLst/>
+            <a:gdLst>
+              <a:gd name="connsiteX0" fmla="*/ 0 w 559472"/>
+              <a:gd name="connsiteY0" fmla="*/ 0 h 3709642"/>
+              <a:gd name="connsiteX1" fmla="*/ 473952 w 559472"/>
+              <a:gd name="connsiteY1" fmla="*/ 0 h 3709642"/>
+              <a:gd name="connsiteX2" fmla="*/ 485840 w 559472"/>
+              <a:gd name="connsiteY2" fmla="*/ 161194 h 3709642"/>
+              <a:gd name="connsiteX3" fmla="*/ 523949 w 559472"/>
+              <a:gd name="connsiteY3" fmla="*/ 3672197 h 3709642"/>
+              <a:gd name="connsiteX4" fmla="*/ 454748 w 559472"/>
+              <a:gd name="connsiteY4" fmla="*/ 3709642 h 3709642"/>
+              <a:gd name="connsiteX5" fmla="*/ 448224 w 559472"/>
+              <a:gd name="connsiteY5" fmla="*/ 3510471 h 3709642"/>
+              <a:gd name="connsiteX6" fmla="*/ 443564 w 559472"/>
+              <a:gd name="connsiteY6" fmla="*/ 3408563 h 3709642"/>
+              <a:gd name="connsiteX7" fmla="*/ 438902 w 559472"/>
+              <a:gd name="connsiteY7" fmla="*/ 3304407 h 3709642"/>
+              <a:gd name="connsiteX8" fmla="*/ 433941 w 559472"/>
+              <a:gd name="connsiteY8" fmla="*/ 3198777 h 3709642"/>
+              <a:gd name="connsiteX9" fmla="*/ 427584 w 559472"/>
+              <a:gd name="connsiteY9" fmla="*/ 3092510 h 3709642"/>
+              <a:gd name="connsiteX10" fmla="*/ 420988 w 559472"/>
+              <a:gd name="connsiteY10" fmla="*/ 2984390 h 3709642"/>
+              <a:gd name="connsiteX11" fmla="*/ 414330 w 559472"/>
+              <a:gd name="connsiteY11" fmla="*/ 2874401 h 3709642"/>
+              <a:gd name="connsiteX12" fmla="*/ 406840 w 559472"/>
+              <a:gd name="connsiteY12" fmla="*/ 2762980 h 3709642"/>
+              <a:gd name="connsiteX13" fmla="*/ 397745 w 559472"/>
+              <a:gd name="connsiteY13" fmla="*/ 2650566 h 3709642"/>
+              <a:gd name="connsiteX14" fmla="*/ 389154 w 559472"/>
+              <a:gd name="connsiteY14" fmla="*/ 2536612 h 3709642"/>
+              <a:gd name="connsiteX15" fmla="*/ 379225 w 559472"/>
+              <a:gd name="connsiteY15" fmla="*/ 2421642 h 3709642"/>
+              <a:gd name="connsiteX16" fmla="*/ 368316 w 559472"/>
+              <a:gd name="connsiteY16" fmla="*/ 2305627 h 3709642"/>
+              <a:gd name="connsiteX17" fmla="*/ 357466 w 559472"/>
+              <a:gd name="connsiteY17" fmla="*/ 2189233 h 3709642"/>
+              <a:gd name="connsiteX18" fmla="*/ 344982 w 559472"/>
+              <a:gd name="connsiteY18" fmla="*/ 2071473 h 3709642"/>
+              <a:gd name="connsiteX19" fmla="*/ 332466 w 559472"/>
+              <a:gd name="connsiteY19" fmla="*/ 1952216 h 3709642"/>
+              <a:gd name="connsiteX20" fmla="*/ 319121 w 559472"/>
+              <a:gd name="connsiteY20" fmla="*/ 1833776 h 3709642"/>
+              <a:gd name="connsiteX21" fmla="*/ 304408 w 559472"/>
+              <a:gd name="connsiteY21" fmla="*/ 1713948 h 3709642"/>
+              <a:gd name="connsiteX22" fmla="*/ 288685 w 559472"/>
+              <a:gd name="connsiteY22" fmla="*/ 1592703 h 3709642"/>
+              <a:gd name="connsiteX23" fmla="*/ 273050 w 559472"/>
+              <a:gd name="connsiteY23" fmla="*/ 1471451 h 3709642"/>
+              <a:gd name="connsiteX24" fmla="*/ 255813 w 559472"/>
+              <a:gd name="connsiteY24" fmla="*/ 1350328 h 3709642"/>
+              <a:gd name="connsiteX25" fmla="*/ 237060 w 559472"/>
+              <a:gd name="connsiteY25" fmla="*/ 1227080 h 3709642"/>
+              <a:gd name="connsiteX26" fmla="*/ 218488 w 559472"/>
+              <a:gd name="connsiteY26" fmla="*/ 1106065 h 3709642"/>
+              <a:gd name="connsiteX27" fmla="*/ 198221 w 559472"/>
+              <a:gd name="connsiteY27" fmla="*/ 982940 h 3709642"/>
+              <a:gd name="connsiteX28" fmla="*/ 177152 w 559472"/>
+              <a:gd name="connsiteY28" fmla="*/ 858755 h 3709642"/>
+              <a:gd name="connsiteX29" fmla="*/ 155551 w 559472"/>
+              <a:gd name="connsiteY29" fmla="*/ 736861 h 3709642"/>
+              <a:gd name="connsiteX30" fmla="*/ 131782 w 559472"/>
+              <a:gd name="connsiteY30" fmla="*/ 613645 h 3709642"/>
+              <a:gd name="connsiteX31" fmla="*/ 107123 w 559472"/>
+              <a:gd name="connsiteY31" fmla="*/ 490500 h 3709642"/>
+              <a:gd name="connsiteX32" fmla="*/ 82552 w 559472"/>
+              <a:gd name="connsiteY32" fmla="*/ 367348 h 3709642"/>
+              <a:gd name="connsiteX33" fmla="*/ 55608 w 559472"/>
+              <a:gd name="connsiteY33" fmla="*/ 244762 h 3709642"/>
+              <a:gd name="connsiteX34" fmla="*/ 28130 w 559472"/>
+              <a:gd name="connsiteY34" fmla="*/ 122220 h 3709642"/>
+              <a:gd name="connsiteX35" fmla="*/ 0 w 559472"/>
+              <a:gd name="connsiteY35" fmla="*/ 0 h 3709642"/>
+            </a:gdLst>
+            <a:ahLst/>
+            <a:cxnLst>
+              <a:cxn ang="0">
+                <a:pos x="connsiteX0" y="connsiteY0"/>
+              </a:cxn>
+              <a:cxn ang="0">
+                <a:pos x="connsiteX1" y="connsiteY1"/>
+              </a:cxn>
+              <a:cxn ang="0">
+                <a:pos x="connsiteX2" y="connsiteY2"/>
+              </a:cxn>
+              <a:cxn ang="0">
+                <a:pos x="connsiteX3" y="connsiteY3"/>
+              </a:cxn>
+              <a:cxn ang="0">
+                <a:pos x="connsiteX4" y="connsiteY4"/>
+              </a:cxn>
+              <a:cxn ang="0">
+                <a:pos x="connsiteX5" y="connsiteY5"/>
+              </a:cxn>
+              <a:cxn ang="0">
+                <a:pos x="connsiteX6" y="connsiteY6"/>
+              </a:cxn>
+              <a:cxn ang="0">
+                <a:pos x="connsiteX7" y="connsiteY7"/>
+              </a:cxn>
+              <a:cxn ang="0">
+                <a:pos x="connsiteX8" y="connsiteY8"/>
+              </a:cxn>
+              <a:cxn ang="0">
+                <a:pos x="connsiteX9" y="connsiteY9"/>
+              </a:cxn>
+              <a:cxn ang="0">
+                <a:pos x="connsiteX10" y="connsiteY10"/>
+              </a:cxn>
+              <a:cxn ang="0">
+                <a:pos x="connsiteX11" y="connsiteY11"/>
+              </a:cxn>
+              <a:cxn ang="0">
+                <a:pos x="connsiteX12" y="connsiteY12"/>
+              </a:cxn>
+              <a:cxn ang="0">
+                <a:pos x="connsiteX13" y="connsiteY13"/>
+              </a:cxn>
+              <a:cxn ang="0">
+                <a:pos x="connsiteX14" y="connsiteY14"/>
+              </a:cxn>
+              <a:cxn ang="0">
+                <a:pos x="connsiteX15" y="connsiteY15"/>
+              </a:cxn>
+              <a:cxn ang="0">
+                <a:pos x="connsiteX16" y="connsiteY16"/>
+              </a:cxn>
+              <a:cxn ang="0">
+                <a:pos x="connsiteX17" y="connsiteY17"/>
+              </a:cxn>
+              <a:cxn ang="0">
+                <a:pos x="connsiteX18" y="connsiteY18"/>
+              </a:cxn>
+              <a:cxn ang="0">
+                <a:pos x="connsiteX19" y="connsiteY19"/>
+              </a:cxn>
+              <a:cxn ang="0">
+                <a:pos x="connsiteX20" y="connsiteY20"/>
+              </a:cxn>
+              <a:cxn ang="0">
+                <a:pos x="connsiteX21" y="connsiteY21"/>
+              </a:cxn>
+              <a:cxn ang="0">
+                <a:pos x="connsiteX22" y="connsiteY22"/>
+              </a:cxn>
+              <a:cxn ang="0">
+                <a:pos x="connsiteX23" y="connsiteY23"/>
+              </a:cxn>
+              <a:cxn ang="0">
+                <a:pos x="connsiteX24" y="connsiteY24"/>
+              </a:cxn>
+              <a:cxn ang="0">
+                <a:pos x="connsiteX25" y="connsiteY25"/>
+              </a:cxn>
+              <a:cxn ang="0">
+                <a:pos x="connsiteX26" y="connsiteY26"/>
+              </a:cxn>
+              <a:cxn ang="0">
+                <a:pos x="connsiteX27" y="connsiteY27"/>
+              </a:cxn>
+              <a:cxn ang="0">
+                <a:pos x="connsiteX28" y="connsiteY28"/>
+              </a:cxn>
+              <a:cxn ang="0">
+                <a:pos x="connsiteX29" y="connsiteY29"/>
+              </a:cxn>
+              <a:cxn ang="0">
+                <a:pos x="connsiteX30" y="connsiteY30"/>
+              </a:cxn>
+              <a:cxn ang="0">
+                <a:pos x="connsiteX31" y="connsiteY31"/>
+              </a:cxn>
+              <a:cxn ang="0">
+                <a:pos x="connsiteX32" y="connsiteY32"/>
+              </a:cxn>
+              <a:cxn ang="0">
+                <a:pos x="connsiteX33" y="connsiteY33"/>
+              </a:cxn>
+              <a:cxn ang="0">
+                <a:pos x="connsiteX34" y="connsiteY34"/>
+              </a:cxn>
+              <a:cxn ang="0">
+                <a:pos x="connsiteX35" y="connsiteY35"/>
+              </a:cxn>
+            </a:cxnLst>
+            <a:rect l="l" t="t" r="r" b="b"/>
+            <a:pathLst>
+              <a:path w="559472" h="3709642">
+                <a:moveTo>
+                  <a:pt x="0" y="0"/>
+                </a:moveTo>
+                <a:lnTo>
+                  <a:pt x="473952" y="0"/>
+                </a:lnTo>
+                <a:lnTo>
+                  <a:pt x="485840" y="161194"/>
+                </a:lnTo>
+                <a:cubicBezTo>
+                  <a:pt x="552063" y="1147770"/>
+                  <a:pt x="592441" y="3086737"/>
+                  <a:pt x="523949" y="3672197"/>
+                </a:cubicBezTo>
+                <a:cubicBezTo>
+                  <a:pt x="500842" y="3684557"/>
+                  <a:pt x="477855" y="3697282"/>
+                  <a:pt x="454748" y="3709642"/>
+                </a:cubicBezTo>
+                <a:lnTo>
+                  <a:pt x="448224" y="3510471"/>
+                </a:lnTo>
+                <a:lnTo>
+                  <a:pt x="443564" y="3408563"/>
+                </a:lnTo>
+                <a:lnTo>
+                  <a:pt x="438902" y="3304407"/>
+                </a:lnTo>
+                <a:lnTo>
+                  <a:pt x="433941" y="3198777"/>
+                </a:lnTo>
+                <a:lnTo>
+                  <a:pt x="427584" y="3092510"/>
+                </a:lnTo>
+                <a:lnTo>
+                  <a:pt x="420988" y="2984390"/>
+                </a:lnTo>
+                <a:lnTo>
+                  <a:pt x="414330" y="2874401"/>
+                </a:lnTo>
+                <a:lnTo>
+                  <a:pt x="406840" y="2762980"/>
+                </a:lnTo>
+                <a:lnTo>
+                  <a:pt x="397745" y="2650566"/>
+                </a:lnTo>
+                <a:lnTo>
+                  <a:pt x="389154" y="2536612"/>
+                </a:lnTo>
+                <a:lnTo>
+                  <a:pt x="379225" y="2421642"/>
+                </a:lnTo>
+                <a:lnTo>
+                  <a:pt x="368316" y="2305627"/>
+                </a:lnTo>
+                <a:lnTo>
+                  <a:pt x="357466" y="2189233"/>
+                </a:lnTo>
+                <a:lnTo>
+                  <a:pt x="344982" y="2071473"/>
+                </a:lnTo>
+                <a:lnTo>
+                  <a:pt x="332466" y="1952216"/>
+                </a:lnTo>
+                <a:lnTo>
+                  <a:pt x="319121" y="1833776"/>
+                </a:lnTo>
+                <a:lnTo>
+                  <a:pt x="304408" y="1713948"/>
+                </a:lnTo>
+                <a:lnTo>
+                  <a:pt x="288685" y="1592703"/>
+                </a:lnTo>
+                <a:lnTo>
+                  <a:pt x="273050" y="1471451"/>
+                </a:lnTo>
+                <a:lnTo>
+                  <a:pt x="255813" y="1350328"/>
+                </a:lnTo>
+                <a:lnTo>
+                  <a:pt x="237060" y="1227080"/>
+                </a:lnTo>
+                <a:lnTo>
+                  <a:pt x="218488" y="1106065"/>
+                </a:lnTo>
+                <a:lnTo>
+                  <a:pt x="198221" y="982940"/>
+                </a:lnTo>
+                <a:lnTo>
+                  <a:pt x="177152" y="858755"/>
+                </a:lnTo>
+                <a:lnTo>
+                  <a:pt x="155551" y="736861"/>
+                </a:lnTo>
+                <a:lnTo>
+                  <a:pt x="131782" y="613645"/>
+                </a:lnTo>
+                <a:lnTo>
+                  <a:pt x="107123" y="490500"/>
+                </a:lnTo>
+                <a:lnTo>
+                  <a:pt x="82552" y="367348"/>
+                </a:lnTo>
+                <a:lnTo>
+                  <a:pt x="55608" y="244762"/>
+                </a:lnTo>
+                <a:lnTo>
+                  <a:pt x="28130" y="122220"/>
+                </a:lnTo>
+                <a:lnTo>
+                  <a:pt x="0" y="0"/>
+                </a:lnTo>
+                <a:close/>
+              </a:path>
+            </a:pathLst>
+          </a:custGeom>
+          <a:solidFill>
+            <a:schemeClr val="tx1">
+              <a:alpha val="20000"/>
+            </a:schemeClr>
+          </a:solidFill>
+          <a:ln>
+            <a:noFill/>
+          </a:ln>
+        </p:spPr>
+        <p:txBody>
+          <a:bodyPr rtlCol="0" anchor="ctr"/>
+          <a:lstStyle/>
+          <a:p>
+            <a:pPr algn="ctr"/>
+            <a:endParaRPr lang="en-US"/>
+          </a:p>
+        </p:txBody>
+      </p:sp>
+      <p:sp>
+        <p:nvSpPr>
+          <p:cNvPr id="51" name="Rectangle 50">
+            <a:extLst>
+              <a:ext uri="{FF2B5EF4-FFF2-40B4-BE49-F238E27FC236}">
+                <a16:creationId xmlns:a16="http://schemas.microsoft.com/office/drawing/2014/main" id="{B91CB0D8-FCC7-402D-A22B-47D345BDCB2C}"/>
+              </a:ext>
+              <a:ext uri="{C183D7F6-B498-43B3-948B-1728B52AA6E4}">
+                <adec:decorative xmlns:adec="http://schemas.microsoft.com/office/drawing/2017/decorative" val="1"/>
+              </a:ext>
+            </a:extLst>
+          </p:cNvPr>
+          <p:cNvSpPr>
+            <a:spLocks noGrp="1" noRot="1" noChangeAspect="1" noMove="1" noResize="1" noEditPoints="1" noAdjustHandles="1" noChangeArrowheads="1" noChangeShapeType="1" noTextEdit="1"/>
+          </p:cNvSpPr>
+          <p:nvPr>
+            <p:extLst>
+              <p:ext uri="{386F3935-93C4-4BCD-93E2-E3B085C9AB24}">
+                <p16:designElem xmlns:p16="http://schemas.microsoft.com/office/powerpoint/2015/main" val="1"/>
+              </p:ext>
+            </p:extLst>
+          </p:nvPr>
+        </p:nvSpPr>
+        <p:spPr>
+          <a:xfrm>
+            <a:off x="4639056" y="0"/>
+            <a:ext cx="7552944" cy="6858000"/>
+          </a:xfrm>
+          <a:prstGeom prst="rect">
+            <a:avLst/>
+          </a:prstGeom>
+          <a:solidFill>
+            <a:srgbClr val="FFFFFF"/>
+          </a:solidFill>
+          <a:ln>
+            <a:noFill/>
+          </a:ln>
+        </p:spPr>
+        <p:style>
+          <a:lnRef idx="2">
+            <a:schemeClr val="accent1">
+              <a:shade val="50000"/>
+            </a:schemeClr>
+          </a:lnRef>
+          <a:fillRef idx="1">
+            <a:schemeClr val="accent1"/>
+          </a:fillRef>
+          <a:effectRef idx="0">
+            <a:schemeClr val="accent1"/>
+          </a:effectRef>
+          <a:fontRef idx="minor">
+            <a:schemeClr val="lt1"/>
+          </a:fontRef>
+        </p:style>
+        <p:txBody>
+          <a:bodyPr rtlCol="0" anchor="ctr"/>
+          <a:lstStyle/>
+          <a:p>
+            <a:pPr algn="ctr"/>
+            <a:endParaRPr lang="en-US"/>
+          </a:p>
+        </p:txBody>
+      </p:sp>
+      <p:sp>
+        <p:nvSpPr>
+          <p:cNvPr id="53" name="Freeform 5">
+            <a:extLst>
+              <a:ext uri="{FF2B5EF4-FFF2-40B4-BE49-F238E27FC236}">
+                <a16:creationId xmlns:a16="http://schemas.microsoft.com/office/drawing/2014/main" id="{AF5F0A42-AA4F-47C8-BF18-C22FD12B4C42}"/>
+              </a:ext>
+              <a:ext uri="{C183D7F6-B498-43B3-948B-1728B52AA6E4}">
+                <adec:decorative xmlns:adec="http://schemas.microsoft.com/office/drawing/2017/decorative" val="1"/>
+              </a:ext>
+            </a:extLst>
+          </p:cNvPr>
+          <p:cNvSpPr>
+            <a:spLocks noGrp="1" noRot="1" noChangeAspect="1" noMove="1" noResize="1" noEditPoints="1" noAdjustHandles="1" noChangeArrowheads="1" noChangeShapeType="1" noTextEdit="1"/>
+          </p:cNvSpPr>
+          <p:nvPr>
+            <p:extLst>
+              <p:ext uri="{386F3935-93C4-4BCD-93E2-E3B085C9AB24}">
+                <p16:designElem xmlns:p16="http://schemas.microsoft.com/office/powerpoint/2015/main" val="1"/>
+              </p:ext>
+            </p:extLst>
+          </p:nvPr>
+        </p:nvSpPr>
+        <p:spPr bwMode="gray">
+          <a:xfrm rot="16200000">
+            <a:off x="1404667" y="2756642"/>
+            <a:ext cx="6858000" cy="1344715"/>
+          </a:xfrm>
+          <a:custGeom>
+            <a:avLst/>
+            <a:gdLst/>
+            <a:ahLst/>
+            <a:cxnLst/>
+            <a:rect l="l" t="t" r="r" b="b"/>
+            <a:pathLst>
+              <a:path w="10000" h="8000">
+                <a:moveTo>
+                  <a:pt x="0" y="0"/>
+                </a:moveTo>
+                <a:lnTo>
+                  <a:pt x="0" y="7970"/>
+                </a:lnTo>
+                <a:lnTo>
+                  <a:pt x="10000" y="8000"/>
+                </a:lnTo>
+                <a:lnTo>
+                  <a:pt x="10000" y="7"/>
+                </a:lnTo>
+                <a:lnTo>
+                  <a:pt x="10000" y="7"/>
+                </a:lnTo>
+                <a:lnTo>
+                  <a:pt x="9773" y="156"/>
+                </a:lnTo>
+                <a:lnTo>
+                  <a:pt x="9547" y="298"/>
+                </a:lnTo>
+                <a:lnTo>
+                  <a:pt x="9320" y="437"/>
+                </a:lnTo>
+                <a:lnTo>
+                  <a:pt x="9092" y="556"/>
+                </a:lnTo>
+                <a:lnTo>
+                  <a:pt x="8865" y="676"/>
+                </a:lnTo>
+                <a:lnTo>
+                  <a:pt x="8637" y="788"/>
+                </a:lnTo>
+                <a:lnTo>
+                  <a:pt x="8412" y="884"/>
+                </a:lnTo>
+                <a:lnTo>
+                  <a:pt x="8184" y="975"/>
+                </a:lnTo>
+                <a:lnTo>
+                  <a:pt x="7957" y="1058"/>
+                </a:lnTo>
+                <a:lnTo>
+                  <a:pt x="7734" y="1130"/>
+                </a:lnTo>
+                <a:lnTo>
+                  <a:pt x="7508" y="1202"/>
+                </a:lnTo>
+                <a:lnTo>
+                  <a:pt x="7285" y="1262"/>
+                </a:lnTo>
+                <a:lnTo>
+                  <a:pt x="7062" y="1309"/>
+                </a:lnTo>
+                <a:lnTo>
+                  <a:pt x="6840" y="1358"/>
+                </a:lnTo>
+                <a:lnTo>
+                  <a:pt x="6620" y="1399"/>
+                </a:lnTo>
+                <a:lnTo>
+                  <a:pt x="6402" y="1428"/>
+                </a:lnTo>
+                <a:lnTo>
+                  <a:pt x="6184" y="1453"/>
+                </a:lnTo>
+                <a:lnTo>
+                  <a:pt x="5968" y="1477"/>
+                </a:lnTo>
+                <a:lnTo>
+                  <a:pt x="5755" y="1488"/>
+                </a:lnTo>
+                <a:lnTo>
+                  <a:pt x="5542" y="1500"/>
+                </a:lnTo>
+                <a:lnTo>
+                  <a:pt x="5332" y="1506"/>
+                </a:lnTo>
+                <a:lnTo>
+                  <a:pt x="5124" y="1500"/>
+                </a:lnTo>
+                <a:lnTo>
+                  <a:pt x="4918" y="1500"/>
+                </a:lnTo>
+                <a:lnTo>
+                  <a:pt x="4714" y="1488"/>
+                </a:lnTo>
+                <a:lnTo>
+                  <a:pt x="4514" y="1470"/>
+                </a:lnTo>
+                <a:lnTo>
+                  <a:pt x="4316" y="1453"/>
+                </a:lnTo>
+                <a:lnTo>
+                  <a:pt x="4122" y="1434"/>
+                </a:lnTo>
+                <a:lnTo>
+                  <a:pt x="3929" y="1405"/>
+                </a:lnTo>
+                <a:lnTo>
+                  <a:pt x="3739" y="1374"/>
+                </a:lnTo>
+                <a:lnTo>
+                  <a:pt x="3553" y="1346"/>
+                </a:lnTo>
+                <a:lnTo>
+                  <a:pt x="3190" y="1267"/>
+                </a:lnTo>
+                <a:lnTo>
+                  <a:pt x="2842" y="1183"/>
+                </a:lnTo>
+                <a:lnTo>
+                  <a:pt x="2508" y="1095"/>
+                </a:lnTo>
+                <a:lnTo>
+                  <a:pt x="2192" y="998"/>
+                </a:lnTo>
+                <a:lnTo>
+                  <a:pt x="1890" y="897"/>
+                </a:lnTo>
+                <a:lnTo>
+                  <a:pt x="1610" y="788"/>
+                </a:lnTo>
+                <a:lnTo>
+                  <a:pt x="1347" y="681"/>
+                </a:lnTo>
+                <a:lnTo>
+                  <a:pt x="1105" y="574"/>
+                </a:lnTo>
+                <a:lnTo>
+                  <a:pt x="883" y="473"/>
+                </a:lnTo>
+                <a:lnTo>
+                  <a:pt x="686" y="377"/>
+                </a:lnTo>
+                <a:lnTo>
+                  <a:pt x="508" y="286"/>
+                </a:lnTo>
+                <a:lnTo>
+                  <a:pt x="358" y="210"/>
+                </a:lnTo>
+                <a:lnTo>
+                  <a:pt x="232" y="138"/>
+                </a:lnTo>
+                <a:lnTo>
+                  <a:pt x="59" y="35"/>
+                </a:lnTo>
+                <a:lnTo>
+                  <a:pt x="0" y="0"/>
+                </a:lnTo>
+                <a:lnTo>
+                  <a:pt x="0" y="0"/>
+                </a:lnTo>
+                <a:close/>
+              </a:path>
+            </a:pathLst>
+          </a:custGeom>
+          <a:solidFill>
+            <a:srgbClr val="FFFFFF"/>
+          </a:solidFill>
+          <a:ln>
+            <a:noFill/>
+          </a:ln>
+        </p:spPr>
+      </p:sp>
+      <p:sp>
+        <p:nvSpPr>
+          <p:cNvPr id="55" name="Rectangle 54">
+            <a:extLst>
+              <a:ext uri="{FF2B5EF4-FFF2-40B4-BE49-F238E27FC236}">
+                <a16:creationId xmlns:a16="http://schemas.microsoft.com/office/drawing/2014/main" id="{052B1A1D-D947-43CC-882E-78CECF8D1E6C}"/>
+              </a:ext>
+              <a:ext uri="{C183D7F6-B498-43B3-948B-1728B52AA6E4}">
+                <adec:decorative xmlns:adec="http://schemas.microsoft.com/office/drawing/2017/decorative" val="1"/>
+              </a:ext>
+            </a:extLst>
+          </p:cNvPr>
+          <p:cNvSpPr>
+            <a:spLocks noGrp="1" noRot="1" noChangeAspect="1" noMove="1" noResize="1" noEditPoints="1" noAdjustHandles="1" noChangeArrowheads="1" noChangeShapeType="1" noTextEdit="1"/>
+          </p:cNvSpPr>
+          <p:nvPr>
+            <p:extLst>
+              <p:ext uri="{386F3935-93C4-4BCD-93E2-E3B085C9AB24}">
+                <p16:designElem xmlns:p16="http://schemas.microsoft.com/office/powerpoint/2015/main" val="1"/>
+              </p:ext>
+            </p:extLst>
+          </p:nvPr>
+        </p:nvSpPr>
+        <p:spPr>
+          <a:xfrm>
+            <a:off x="10437812" y="0"/>
+            <a:ext cx="685800" cy="1143000"/>
+          </a:xfrm>
+          <a:prstGeom prst="rect">
+            <a:avLst/>
+          </a:prstGeom>
+          <a:solidFill>
+            <a:schemeClr val="accent1"/>
+          </a:solidFill>
+          <a:ln>
+            <a:noFill/>
+          </a:ln>
+        </p:spPr>
+        <p:style>
+          <a:lnRef idx="1">
+            <a:schemeClr val="accent1"/>
+          </a:lnRef>
+          <a:fillRef idx="3">
+            <a:schemeClr val="accent1"/>
+          </a:fillRef>
+          <a:effectRef idx="2">
+            <a:schemeClr val="accent1"/>
+          </a:effectRef>
+          <a:fontRef idx="minor">
+            <a:schemeClr val="lt1"/>
+          </a:fontRef>
+        </p:style>
+      </p:sp>
+      <p:sp>
+        <p:nvSpPr>
+          <p:cNvPr id="37" name="Content Placeholder 36">
+            <a:extLst>
+              <a:ext uri="{FF2B5EF4-FFF2-40B4-BE49-F238E27FC236}">
+                <a16:creationId xmlns:a16="http://schemas.microsoft.com/office/drawing/2014/main" id="{F43144B4-AF07-4E47-9E2A-BE6824767D4B}"/>
+              </a:ext>
+            </a:extLst>
+          </p:cNvPr>
+          <p:cNvSpPr>
+            <a:spLocks noGrp="1"/>
+          </p:cNvSpPr>
+          <p:nvPr>
+            <p:ph idx="1"/>
+          </p:nvPr>
+        </p:nvSpPr>
+        <p:spPr>
+          <a:xfrm>
+            <a:off x="643855" y="3072385"/>
+            <a:ext cx="3108057" cy="2947415"/>
+          </a:xfrm>
+        </p:spPr>
+        <p:txBody>
+          <a:bodyPr>
+            <a:normAutofit fontScale="77500" lnSpcReduction="20000"/>
+          </a:bodyPr>
+          <a:lstStyle/>
+          <a:p>
+            <a:pPr algn="r" rtl="1"/>
+            <a:r>
+              <a:rPr lang="he-IL" sz="2800" dirty="0">
+                <a:latin typeface="Calibri" panose="020F0502020204030204" pitchFamily="34" charset="0"/>
+                <a:cs typeface="Arial" panose="020B0604020202020204" pitchFamily="34" charset="0"/>
+              </a:rPr>
+              <a:t>הוספנו לניתוח מה קורה כאשר מורידים מימד בעזרת ספריית </a:t>
+            </a:r>
+            <a:r>
+              <a:rPr lang="en-US" sz="2800" dirty="0">
+                <a:latin typeface="Calibri" panose="020F0502020204030204" pitchFamily="34" charset="0"/>
+                <a:cs typeface="Arial" panose="020B0604020202020204" pitchFamily="34" charset="0"/>
+              </a:rPr>
+              <a:t>PCA</a:t>
+            </a:r>
+            <a:r>
+              <a:rPr lang="he-IL" sz="2800" dirty="0">
+                <a:latin typeface="Calibri" panose="020F0502020204030204" pitchFamily="34" charset="0"/>
+                <a:cs typeface="Arial" panose="020B0604020202020204" pitchFamily="34" charset="0"/>
+              </a:rPr>
+              <a:t>.</a:t>
+            </a:r>
+          </a:p>
+          <a:p>
+            <a:pPr algn="r" rtl="1"/>
+            <a:r>
+              <a:rPr lang="he-IL" sz="2800" dirty="0">
+                <a:latin typeface="Calibri" panose="020F0502020204030204" pitchFamily="34" charset="0"/>
+                <a:cs typeface="Arial" panose="020B0604020202020204" pitchFamily="34" charset="0"/>
+              </a:rPr>
+              <a:t>ניתן לראות את 5 העמודות הקריטיות שהראנו כבר מקודם, ועבור כל עמודה (</a:t>
+            </a:r>
+            <a:r>
+              <a:rPr lang="en-IL" sz="2800" dirty="0">
+                <a:latin typeface="Calibri" panose="020F0502020204030204" pitchFamily="34" charset="0"/>
+                <a:cs typeface="Arial" panose="020B0604020202020204" pitchFamily="34" charset="0"/>
+              </a:rPr>
+              <a:t>PCA</a:t>
+            </a:r>
+            <a:r>
+              <a:rPr lang="he-IL" sz="2800" dirty="0">
+                <a:latin typeface="Calibri" panose="020F0502020204030204" pitchFamily="34" charset="0"/>
+                <a:cs typeface="Arial" panose="020B0604020202020204" pitchFamily="34" charset="0"/>
+              </a:rPr>
+              <a:t> </a:t>
+            </a:r>
+            <a:r>
+              <a:rPr lang="en-IL" sz="2800" dirty="0">
+                <a:latin typeface="Calibri" panose="020F0502020204030204" pitchFamily="34" charset="0"/>
+                <a:cs typeface="Arial" panose="020B0604020202020204" pitchFamily="34" charset="0"/>
+              </a:rPr>
+              <a:t>Feature</a:t>
+            </a:r>
+            <a:r>
+              <a:rPr lang="he-IL" sz="2800" dirty="0">
+                <a:latin typeface="Calibri" panose="020F0502020204030204" pitchFamily="34" charset="0"/>
+                <a:cs typeface="Arial" panose="020B0604020202020204" pitchFamily="34" charset="0"/>
+              </a:rPr>
+              <a:t>) מהי השונות שלה כאשר אנו מורידים את המימד.</a:t>
+            </a:r>
+          </a:p>
+          <a:p>
+            <a:pPr algn="r" rtl="1"/>
+            <a:endParaRPr lang="en-US" sz="1400" dirty="0"/>
+          </a:p>
+        </p:txBody>
+      </p:sp>
+      <p:pic>
+        <p:nvPicPr>
+          <p:cNvPr id="7" name="Content Placeholder 6" descr="Chart, bar chart&#10;&#10;Description automatically generated">
+            <a:extLst>
+              <a:ext uri="{FF2B5EF4-FFF2-40B4-BE49-F238E27FC236}">
+                <a16:creationId xmlns:a16="http://schemas.microsoft.com/office/drawing/2014/main" id="{2EF1C317-7AE2-49C9-8C2A-70D9C29C556C}"/>
+              </a:ext>
+            </a:extLst>
+          </p:cNvPr>
+          <p:cNvPicPr>
+            <a:picLocks noChangeAspect="1"/>
+          </p:cNvPicPr>
+          <p:nvPr/>
+        </p:nvPicPr>
+        <p:blipFill>
+          <a:blip r:embed="rId3">
+            <a:extLst>
+              <a:ext uri="{28A0092B-C50C-407E-A947-70E740481C1C}">
+                <a14:useLocalDpi xmlns:a14="http://schemas.microsoft.com/office/drawing/2010/main" val="0"/>
+              </a:ext>
+            </a:extLst>
+          </a:blip>
+          <a:stretch>
+            <a:fillRect/>
+          </a:stretch>
+        </p:blipFill>
+        <p:spPr>
+          <a:xfrm>
+            <a:off x="4639056" y="1854820"/>
+            <a:ext cx="7219925" cy="3955312"/>
+          </a:xfrm>
+          <a:prstGeom prst="rect">
+            <a:avLst/>
+          </a:prstGeom>
+          <a:effectLst/>
+        </p:spPr>
+      </p:pic>
+    </p:spTree>
+    <p:extLst>
+      <p:ext uri="{BB962C8B-B14F-4D97-AF65-F5344CB8AC3E}">
+        <p14:creationId xmlns:p14="http://schemas.microsoft.com/office/powerpoint/2010/main" val="1000169914"/>
+      </p:ext>
+    </p:extLst>
+  </p:cSld>
+  <p:clrMapOvr>
+    <a:masterClrMapping/>
+  </p:clrMapOvr>
+</p:sld>
+</file>
+
+<file path=ppt/slides/slide14.xml><?xml version="1.0" encoding="utf-8"?>
+<p:sld xmlns:a="http://schemas.openxmlformats.org/drawingml/2006/main" xmlns:r="http://schemas.openxmlformats.org/officeDocument/2006/relationships" xmlns:p="http://schemas.openxmlformats.org/presentationml/2006/main">
+  <p:cSld>
+    <p:bg>
+      <p:bgPr>
+        <a:blipFill rotWithShape="1">
+          <a:blip r:embed="rId2">
+            <a:duotone>
+              <a:schemeClr val="bg2">
+                <a:shade val="69000"/>
+                <a:hueMod val="91000"/>
+                <a:satMod val="164000"/>
+                <a:lumMod val="74000"/>
+              </a:schemeClr>
+              <a:schemeClr val="bg2">
+                <a:hueMod val="124000"/>
+                <a:satMod val="140000"/>
+                <a:lumMod val="142000"/>
+              </a:schemeClr>
+            </a:duotone>
+          </a:blip>
+          <a:stretch/>
+        </a:blipFill>
+        <a:effectLst/>
+      </p:bgPr>
+    </p:bg>
+    <p:spTree>
+      <p:nvGrpSpPr>
+        <p:cNvPr id="1" name=""/>
+        <p:cNvGrpSpPr/>
+        <p:nvPr/>
+      </p:nvGrpSpPr>
+      <p:grpSpPr>
+        <a:xfrm>
+          <a:off x="0" y="0"/>
+          <a:ext cx="0" cy="0"/>
+          <a:chOff x="0" y="0"/>
+          <a:chExt cx="0" cy="0"/>
+        </a:xfrm>
+      </p:grpSpPr>
       <p:pic>
         <p:nvPicPr>
           <p:cNvPr id="26" name="Picture 10">

</xml_diff>